<commit_message>
DNK & CHAT BOT PPTs
</commit_message>
<xml_diff>
--- a/PPTs/SIH1305 ChatBot.pptx
+++ b/PPTs/SIH1305 ChatBot.pptx
@@ -11,7 +11,7 @@
     <p:sldId id="256" r:id="rId2"/>
     <p:sldId id="257" r:id="rId3"/>
     <p:sldId id="260" r:id="rId4"/>
-    <p:sldId id="259" r:id="rId5"/>
+    <p:sldId id="262" r:id="rId5"/>
   </p:sldIdLst>
   <p:sldSz cx="12192000" cy="6858000"/>
   <p:notesSz cx="6858000" cy="9144000"/>
@@ -290,7 +290,7 @@
       </p15:sldGuideLst>
     </p:ext>
     <p:ext uri="http://customooxmlschemas.google.com/">
-      <go:slidesCustomData xmlns="" xmlns:mc="http://schemas.openxmlformats.org/markup-compatibility/2006" xmlns:mv="urn:schemas-microsoft-com:mac:vml" xmlns:c="http://schemas.openxmlformats.org/drawingml/2006/chart" xmlns:dgm="http://schemas.openxmlformats.org/drawingml/2006/diagram" xmlns:o="urn:schemas-microsoft-com:office:office" xmlns:v="urn:schemas-microsoft-com:vml" xmlns:pvml="urn:schemas-microsoft-com:office:powerpoint" xmlns:com="http://schemas.openxmlformats.org/drawingml/2006/compatibility" xmlns:p14="http://schemas.microsoft.com/office/powerpoint/2010/main" xmlns:p15="http://schemas.microsoft.com/office/powerpoint/2012/main" xmlns:ahyp="http://schemas.microsoft.com/office/drawing/2018/hyperlinkcolor" xmlns:go="http://customooxmlschemas.google.com/" r:id="rId22" roundtripDataSignature="AMtx7mi1sBDdHb2XsYteFNPHBFMUQvu/sQ=="/>
+      <go:slidesCustomData xmlns:go="http://customooxmlschemas.google.com/" xmlns:ahyp="http://schemas.microsoft.com/office/drawing/2018/hyperlinkcolor" xmlns:p15="http://schemas.microsoft.com/office/powerpoint/2012/main" xmlns:p14="http://schemas.microsoft.com/office/powerpoint/2010/main" xmlns:com="http://schemas.openxmlformats.org/drawingml/2006/compatibility" xmlns:pvml="urn:schemas-microsoft-com:office:powerpoint" xmlns:v="urn:schemas-microsoft-com:vml" xmlns:o="urn:schemas-microsoft-com:office:office" xmlns:dgm="http://schemas.openxmlformats.org/drawingml/2006/diagram" xmlns:c="http://schemas.openxmlformats.org/drawingml/2006/chart" xmlns:mv="urn:schemas-microsoft-com:mac:vml" xmlns:mc="http://schemas.openxmlformats.org/markup-compatibility/2006" xmlns="" r:id="rId22" roundtripDataSignature="AMtx7mi1sBDdHb2XsYteFNPHBFMUQvu/sQ=="/>
     </p:ext>
   </p:extLst>
 </p:presentation>
@@ -1927,11 +1927,6 @@
         </p:spPr>
       </p:sp>
     </p:spTree>
-    <p:extLst>
-      <p:ext uri="{BB962C8B-B14F-4D97-AF65-F5344CB8AC3E}">
-        <p14:creationId xmlns:p14="http://schemas.microsoft.com/office/powerpoint/2010/main" val="3261395458"/>
-      </p:ext>
-    </p:extLst>
   </p:cSld>
   <p:clrMapOvr>
     <a:masterClrMapping/>
@@ -24439,7 +24434,7 @@
               <a:t> </a:t>
             </a:r>
             <a:r>
-              <a:rPr lang="en-US" b="1" dirty="0">
+              <a:rPr lang="en-US" b="1">
                 <a:solidFill>
                   <a:schemeClr val="tx1"/>
                 </a:solidFill>
@@ -24448,7 +24443,7 @@
                 <a:cs typeface="Franklin Gothic"/>
                 <a:sym typeface="Franklin Gothic"/>
               </a:rPr>
-              <a:t>Growth Guards</a:t>
+              <a:t>GrowGuards</a:t>
             </a:r>
             <a:br>
               <a:rPr lang="en-IN" dirty="0">
@@ -29171,65 +29166,10 @@
               <a:buSzPts val="1200"/>
               <a:buNone/>
             </a:pPr>
-            <a:r>
-              <a:rPr lang="en-US" sz="1200" b="1" dirty="0">
-                <a:solidFill>
-                  <a:srgbClr val="804160"/>
-                </a:solidFill>
-                <a:latin typeface="Tahoma" panose="020B0604030504040204" pitchFamily="34" charset="0"/>
-                <a:ea typeface="Tahoma" panose="020B0604030504040204" pitchFamily="34" charset="0"/>
-                <a:cs typeface="Tahoma" panose="020B0604030504040204" pitchFamily="34" charset="0"/>
-              </a:rPr>
-              <a:t>Team Mentor 1 Name: Type Your Name Here</a:t>
-            </a:r>
-            <a:endParaRPr dirty="0">
-              <a:latin typeface="Tahoma" panose="020B0604030504040204" pitchFamily="34" charset="0"/>
-              <a:ea typeface="Tahoma" panose="020B0604030504040204" pitchFamily="34" charset="0"/>
-              <a:cs typeface="Tahoma" panose="020B0604030504040204" pitchFamily="34" charset="0"/>
-            </a:endParaRPr>
-          </a:p>
-          <a:p>
-            <a:pPr marL="0" lvl="0" indent="0" algn="l" rtl="0">
-              <a:lnSpc>
-                <a:spcPct val="90000"/>
-              </a:lnSpc>
-              <a:spcBef>
-                <a:spcPts val="1000"/>
-              </a:spcBef>
-              <a:spcAft>
-                <a:spcPts val="0"/>
-              </a:spcAft>
-              <a:buClr>
-                <a:schemeClr val="dk1"/>
-              </a:buClr>
-              <a:buSzPts val="1200"/>
-              <a:buNone/>
-            </a:pPr>
-            <a:r>
-              <a:rPr lang="en-US" sz="1200" dirty="0">
-                <a:latin typeface="Tahoma" panose="020B0604030504040204" pitchFamily="34" charset="0"/>
-                <a:ea typeface="Tahoma" panose="020B0604030504040204" pitchFamily="34" charset="0"/>
-                <a:cs typeface="Tahoma" panose="020B0604030504040204" pitchFamily="34" charset="0"/>
-              </a:rPr>
-              <a:t>Category (Academic/Industry): 			Expertise (AI/ML/Blockchain </a:t>
-            </a:r>
-            <a:r>
-              <a:rPr lang="en-US" sz="1200" dirty="0" err="1">
-                <a:latin typeface="Tahoma" panose="020B0604030504040204" pitchFamily="34" charset="0"/>
-                <a:ea typeface="Tahoma" panose="020B0604030504040204" pitchFamily="34" charset="0"/>
-                <a:cs typeface="Tahoma" panose="020B0604030504040204" pitchFamily="34" charset="0"/>
-              </a:rPr>
-              <a:t>etc</a:t>
-            </a:r>
-            <a:r>
-              <a:rPr lang="en-US" sz="1200" dirty="0">
-                <a:latin typeface="Tahoma" panose="020B0604030504040204" pitchFamily="34" charset="0"/>
-                <a:ea typeface="Tahoma" panose="020B0604030504040204" pitchFamily="34" charset="0"/>
-                <a:cs typeface="Tahoma" panose="020B0604030504040204" pitchFamily="34" charset="0"/>
-              </a:rPr>
-              <a:t>): 		Domain Experience (in years):    </a:t>
-            </a:r>
-            <a:endParaRPr dirty="0">
+            <a:endParaRPr lang="en-US" sz="1200" b="1" dirty="0">
+              <a:solidFill>
+                <a:srgbClr val="804160"/>
+              </a:solidFill>
               <a:latin typeface="Tahoma" panose="020B0604030504040204" pitchFamily="34" charset="0"/>
               <a:ea typeface="Tahoma" panose="020B0604030504040204" pitchFamily="34" charset="0"/>
               <a:cs typeface="Tahoma" panose="020B0604030504040204" pitchFamily="34" charset="0"/>
@@ -29261,9 +29201,23 @@
                 <a:ea typeface="Tahoma" panose="020B0604030504040204" pitchFamily="34" charset="0"/>
                 <a:cs typeface="Tahoma" panose="020B0604030504040204" pitchFamily="34" charset="0"/>
               </a:rPr>
-              <a:t>Team Mentor 2 Name: Type Your Name Here</a:t>
+              <a:t>Team Mentor 1 Name: </a:t>
+            </a:r>
+            <a:r>
+              <a:rPr lang="en-US" sz="1200" b="1" dirty="0">
+                <a:solidFill>
+                  <a:schemeClr val="tx1"/>
+                </a:solidFill>
+                <a:latin typeface="Tahoma" panose="020B0604030504040204" pitchFamily="34" charset="0"/>
+                <a:ea typeface="Tahoma" panose="020B0604030504040204" pitchFamily="34" charset="0"/>
+                <a:cs typeface="Tahoma" panose="020B0604030504040204" pitchFamily="34" charset="0"/>
+              </a:rPr>
+              <a:t>PROF. RACHANA CHAUDHARI</a:t>
             </a:r>
             <a:endParaRPr dirty="0">
+              <a:solidFill>
+                <a:schemeClr val="tx1"/>
+              </a:solidFill>
               <a:latin typeface="Tahoma" panose="020B0604030504040204" pitchFamily="34" charset="0"/>
               <a:ea typeface="Tahoma" panose="020B0604030504040204" pitchFamily="34" charset="0"/>
               <a:cs typeface="Tahoma" panose="020B0604030504040204" pitchFamily="34" charset="0"/>
@@ -29292,15 +29246,15 @@
                 <a:ea typeface="Tahoma" panose="020B0604030504040204" pitchFamily="34" charset="0"/>
                 <a:cs typeface="Tahoma" panose="020B0604030504040204" pitchFamily="34" charset="0"/>
               </a:rPr>
-              <a:t>Category (Academic/Industry):		 	Expertise (AI/ML/Blockchain </a:t>
+              <a:t>Category : </a:t>
             </a:r>
             <a:r>
-              <a:rPr lang="en-US" sz="1200" dirty="0" err="1">
+              <a:rPr lang="en-US" sz="1200" b="1" dirty="0">
                 <a:latin typeface="Tahoma" panose="020B0604030504040204" pitchFamily="34" charset="0"/>
                 <a:ea typeface="Tahoma" panose="020B0604030504040204" pitchFamily="34" charset="0"/>
                 <a:cs typeface="Tahoma" panose="020B0604030504040204" pitchFamily="34" charset="0"/>
               </a:rPr>
-              <a:t>etc</a:t>
+              <a:t>Academic</a:t>
             </a:r>
             <a:r>
               <a:rPr lang="en-US" sz="1200" dirty="0">
@@ -29308,7 +29262,42 @@
                 <a:ea typeface="Tahoma" panose="020B0604030504040204" pitchFamily="34" charset="0"/>
                 <a:cs typeface="Tahoma" panose="020B0604030504040204" pitchFamily="34" charset="0"/>
               </a:rPr>
-              <a:t>): 		Domain Experience (in years):    </a:t>
+              <a:t>				Expertise: </a:t>
+            </a:r>
+            <a:r>
+              <a:rPr lang="en-US" sz="1200" b="1" dirty="0">
+                <a:solidFill>
+                  <a:schemeClr val="tx1"/>
+                </a:solidFill>
+                <a:latin typeface="Tahoma" panose="020B0604030504040204" pitchFamily="34" charset="0"/>
+                <a:ea typeface="Tahoma" panose="020B0604030504040204" pitchFamily="34" charset="0"/>
+                <a:cs typeface="Tahoma" panose="020B0604030504040204" pitchFamily="34" charset="0"/>
+              </a:rPr>
+              <a:t>Web and Mobile Development</a:t>
+            </a:r>
+            <a:r>
+              <a:rPr lang="en-US" sz="1200" dirty="0">
+                <a:latin typeface="Tahoma" panose="020B0604030504040204" pitchFamily="34" charset="0"/>
+                <a:ea typeface="Tahoma" panose="020B0604030504040204" pitchFamily="34" charset="0"/>
+                <a:cs typeface="Tahoma" panose="020B0604030504040204" pitchFamily="34" charset="0"/>
+              </a:rPr>
+              <a:t>	Domain Experience (in years): </a:t>
+            </a:r>
+            <a:r>
+              <a:rPr lang="en-US" sz="1200" b="1" dirty="0">
+                <a:latin typeface="Tahoma" panose="020B0604030504040204" pitchFamily="34" charset="0"/>
+                <a:ea typeface="Tahoma" panose="020B0604030504040204" pitchFamily="34" charset="0"/>
+                <a:cs typeface="Tahoma" panose="020B0604030504040204" pitchFamily="34" charset="0"/>
+              </a:rPr>
+              <a:t>9</a:t>
+            </a:r>
+            <a:r>
+              <a:rPr lang="en-US" sz="1200" dirty="0">
+                <a:latin typeface="Tahoma" panose="020B0604030504040204" pitchFamily="34" charset="0"/>
+                <a:ea typeface="Tahoma" panose="020B0604030504040204" pitchFamily="34" charset="0"/>
+                <a:cs typeface="Tahoma" panose="020B0604030504040204" pitchFamily="34" charset="0"/>
+              </a:rPr>
+              <a:t>   </a:t>
             </a:r>
             <a:endParaRPr dirty="0">
               <a:latin typeface="Tahoma" panose="020B0604030504040204" pitchFamily="34" charset="0"/>

</xml_diff>